<commit_message>
Codes for Figure 1
</commit_message>
<xml_diff>
--- a/Figure1/Figure_panel/Fig1.pptx
+++ b/Figure1/Figure_panel/Fig1.pptx
@@ -9183,9 +9183,9 @@
         <p:grpSpPr>
           <a:xfrm>
             <a:off x="2627052" y="70469"/>
-            <a:ext cx="1298264" cy="1017392"/>
+            <a:ext cx="1368426" cy="1017392"/>
             <a:chOff x="2634032" y="56509"/>
-            <a:chExt cx="1298264" cy="1017392"/>
+            <a:chExt cx="1368426" cy="1017392"/>
           </a:xfrm>
         </p:grpSpPr>
         <p:pic>
@@ -9382,7 +9382,7 @@
           <p:spPr>
             <a:xfrm>
               <a:off x="2957723" y="673622"/>
-              <a:ext cx="974573" cy="338554"/>
+              <a:ext cx="1044735" cy="338554"/>
             </a:xfrm>
             <a:prstGeom prst="rect">
               <a:avLst/>
@@ -9397,7 +9397,7 @@
             <a:p>
               <a:r>
                 <a:rPr lang="en-US" sz="800" dirty="0"/>
-                <a:t>Non-viable/sterile Female</a:t>
+                <a:t>Edited Female (Non-viable/sterile)</a:t>
               </a:r>
             </a:p>
           </p:txBody>
@@ -9417,7 +9417,7 @@
           <p:spPr>
             <a:xfrm>
               <a:off x="2634032" y="57786"/>
-              <a:ext cx="1225443" cy="1016115"/>
+              <a:ext cx="1325880" cy="1016115"/>
             </a:xfrm>
             <a:prstGeom prst="roundRect">
               <a:avLst/>
@@ -15201,7 +15201,7 @@
         <p:spPr>
           <a:xfrm>
             <a:off x="2950743" y="687582"/>
-            <a:ext cx="974573" cy="338554"/>
+            <a:ext cx="1044737" cy="338554"/>
           </a:xfrm>
           <a:prstGeom prst="rect">
             <a:avLst/>
@@ -15216,7 +15216,7 @@
           <a:p>
             <a:r>
               <a:rPr lang="en-US" sz="800" dirty="0"/>
-              <a:t>Non-viable/sterile Female</a:t>
+              <a:t>Edited Female (Non-viable/sterile)</a:t>
             </a:r>
           </a:p>
         </p:txBody>
@@ -15235,8 +15235,8 @@
         </p:nvSpPr>
         <p:spPr>
           <a:xfrm>
-            <a:off x="2627052" y="71746"/>
-            <a:ext cx="1225443" cy="1016115"/>
+            <a:off x="2627053" y="71746"/>
+            <a:ext cx="1325880" cy="1016115"/>
           </a:xfrm>
           <a:prstGeom prst="roundRect">
             <a:avLst/>

</xml_diff>